<commit_message>
added the world heat map to the powerpoint and put everyones work in the final notebook
</commit_message>
<xml_diff>
--- a/Bulldogs – Project 1 Presentation.pptx
+++ b/Bulldogs – Project 1 Presentation.pptx
@@ -8,15 +8,16 @@
     <p:sldId id="257" r:id="rId2"/>
     <p:sldId id="259" r:id="rId3"/>
     <p:sldId id="260" r:id="rId4"/>
-    <p:sldId id="261" r:id="rId5"/>
-    <p:sldId id="262" r:id="rId6"/>
-    <p:sldId id="263" r:id="rId7"/>
-    <p:sldId id="264" r:id="rId8"/>
-    <p:sldId id="265" r:id="rId9"/>
-    <p:sldId id="266" r:id="rId10"/>
-    <p:sldId id="267" r:id="rId11"/>
-    <p:sldId id="268" r:id="rId12"/>
-    <p:sldId id="270" r:id="rId13"/>
+    <p:sldId id="271" r:id="rId5"/>
+    <p:sldId id="261" r:id="rId6"/>
+    <p:sldId id="262" r:id="rId7"/>
+    <p:sldId id="263" r:id="rId8"/>
+    <p:sldId id="264" r:id="rId9"/>
+    <p:sldId id="265" r:id="rId10"/>
+    <p:sldId id="266" r:id="rId11"/>
+    <p:sldId id="267" r:id="rId12"/>
+    <p:sldId id="268" r:id="rId13"/>
+    <p:sldId id="270" r:id="rId14"/>
   </p:sldIdLst>
   <p:sldSz cx="12192000" cy="6858000"/>
   <p:notesSz cx="6858000" cy="9144000"/>
@@ -367,7 +368,7 @@
           <a:p>
             <a:fld id="{9184DA70-C731-4C70-880D-CCD4705E623C}" type="datetime1">
               <a:rPr lang="en-US" smtClean="0"/>
-              <a:t>7/3/2021</a:t>
+              <a:t>7/5/2021</a:t>
             </a:fld>
             <a:endParaRPr lang="en-US" dirty="0"/>
           </a:p>
@@ -555,7 +556,7 @@
           <a:p>
             <a:fld id="{B612A279-0833-481D-8C56-F67FD0AC6C50}" type="datetime1">
               <a:rPr lang="en-US" smtClean="0"/>
-              <a:t>7/3/2021</a:t>
+              <a:t>7/5/2021</a:t>
             </a:fld>
             <a:endParaRPr lang="en-US" dirty="0"/>
           </a:p>
@@ -797,7 +798,7 @@
           <a:p>
             <a:fld id="{6587DA83-5663-4C9C-B9AA-0B40A3DAFF81}" type="datetime1">
               <a:rPr lang="en-US" smtClean="0"/>
-              <a:t>7/3/2021</a:t>
+              <a:t>7/5/2021</a:t>
             </a:fld>
             <a:endParaRPr lang="en-US" dirty="0"/>
           </a:p>
@@ -985,7 +986,7 @@
           <a:p>
             <a:fld id="{4BE1D723-8F53-4F53-90B0-1982A396982E}" type="datetime1">
               <a:rPr lang="en-US" smtClean="0"/>
-              <a:t>7/3/2021</a:t>
+              <a:t>7/5/2021</a:t>
             </a:fld>
             <a:endParaRPr lang="en-US" dirty="0"/>
           </a:p>
@@ -1358,7 +1359,7 @@
           <a:p>
             <a:fld id="{97669AF7-7BEB-44E4-9852-375E34362B5B}" type="datetime1">
               <a:rPr lang="en-US" smtClean="0"/>
-              <a:t>7/3/2021</a:t>
+              <a:t>7/5/2021</a:t>
             </a:fld>
             <a:endParaRPr lang="en-US" dirty="0"/>
           </a:p>
@@ -1613,7 +1614,7 @@
           <a:p>
             <a:fld id="{BAAAC38D-0552-4C82-B593-E6124DFADBE2}" type="datetime1">
               <a:rPr lang="en-US" smtClean="0"/>
-              <a:t>7/3/2021</a:t>
+              <a:t>7/5/2021</a:t>
             </a:fld>
             <a:endParaRPr lang="en-US" dirty="0"/>
           </a:p>
@@ -2010,7 +2011,7 @@
           <a:p>
             <a:fld id="{D9DF0F1C-5577-4ACB-BB62-DF8F3C494C7E}" type="datetime1">
               <a:rPr lang="en-US" smtClean="0"/>
-              <a:t>7/3/2021</a:t>
+              <a:t>7/5/2021</a:t>
             </a:fld>
             <a:endParaRPr lang="en-US" dirty="0"/>
           </a:p>
@@ -2146,7 +2147,7 @@
           <a:p>
             <a:fld id="{1775B394-D9F9-4F0C-B15D-605F45CB9E9F}" type="datetime1">
               <a:rPr lang="en-US" smtClean="0"/>
-              <a:t>7/3/2021</a:t>
+              <a:t>7/5/2021</a:t>
             </a:fld>
             <a:endParaRPr lang="en-US" dirty="0"/>
           </a:p>
@@ -2303,7 +2304,7 @@
           <a:p>
             <a:fld id="{39667345-2558-425A-8533-9BFDBCE15005}" type="datetime1">
               <a:rPr lang="en-US" smtClean="0"/>
-              <a:t>7/3/2021</a:t>
+              <a:t>7/5/2021</a:t>
             </a:fld>
             <a:endParaRPr lang="en-US" dirty="0"/>
           </a:p>
@@ -2632,7 +2633,7 @@
           <a:p>
             <a:fld id="{92BEA474-078D-4E9B-9B14-09A87B19DC46}" type="datetime1">
               <a:rPr lang="en-US" smtClean="0"/>
-              <a:t>7/3/2021</a:t>
+              <a:t>7/5/2021</a:t>
             </a:fld>
             <a:endParaRPr lang="en-US" dirty="0"/>
           </a:p>
@@ -2982,7 +2983,7 @@
           <a:p>
             <a:fld id="{4907D986-8816-4272-A432-0437A28A9828}" type="datetime1">
               <a:rPr lang="en-US" smtClean="0"/>
-              <a:t>7/3/2021</a:t>
+              <a:t>7/5/2021</a:t>
             </a:fld>
             <a:endParaRPr lang="en-US" dirty="0"/>
           </a:p>
@@ -3243,7 +3244,7 @@
           <a:p>
             <a:fld id="{62D6E202-B606-4609-B914-27C9371A1F6D}" type="datetime1">
               <a:rPr lang="en-US" smtClean="0"/>
-              <a:t>7/3/2021</a:t>
+              <a:t>7/5/2021</a:t>
             </a:fld>
             <a:endParaRPr lang="en-US" dirty="0"/>
           </a:p>
@@ -4124,7 +4125,7 @@
           <p:cNvPr id="2" name="Title 1">
             <a:extLst>
               <a:ext uri="{FF2B5EF4-FFF2-40B4-BE49-F238E27FC236}">
-                <a16:creationId xmlns:a16="http://schemas.microsoft.com/office/drawing/2014/main" id="{AA3EEA82-22CE-4C57-B88A-29CBD65A8447}"/>
+                <a16:creationId xmlns:a16="http://schemas.microsoft.com/office/drawing/2014/main" id="{3D4E0451-3BD3-4D78-8F84-D8B3D8B1A794}"/>
               </a:ext>
             </a:extLst>
           </p:cNvPr>
@@ -4151,10 +4152,10 @@
       </p:sp>
       <p:pic>
         <p:nvPicPr>
-          <p:cNvPr id="10" name="Content Placeholder 9" descr="Chart, scatter chart&#10;&#10;Description automatically generated">
-            <a:extLst>
-              <a:ext uri="{FF2B5EF4-FFF2-40B4-BE49-F238E27FC236}">
-                <a16:creationId xmlns:a16="http://schemas.microsoft.com/office/drawing/2014/main" id="{50FB3BB5-21C7-4C38-BE9B-80F9E527CC8C}"/>
+          <p:cNvPr id="6" name="Content Placeholder 5" descr="Chart, scatter chart&#10;&#10;Description automatically generated">
+            <a:extLst>
+              <a:ext uri="{FF2B5EF4-FFF2-40B4-BE49-F238E27FC236}">
+                <a16:creationId xmlns:a16="http://schemas.microsoft.com/office/drawing/2014/main" id="{4FCB2D05-C297-4A87-8579-6831789294F3}"/>
               </a:ext>
             </a:extLst>
           </p:cNvPr>
@@ -4179,17 +4180,56 @@
         </p:blipFill>
         <p:spPr>
           <a:xfrm>
-            <a:off x="1097280" y="2093457"/>
-            <a:ext cx="4536164" cy="3718168"/>
+            <a:off x="281176" y="2906799"/>
+            <a:ext cx="6230407" cy="3279163"/>
           </a:xfrm>
         </p:spPr>
       </p:pic>
+      <p:sp>
+        <p:nvSpPr>
+          <p:cNvPr id="9" name="TextBox 8">
+            <a:extLst>
+              <a:ext uri="{FF2B5EF4-FFF2-40B4-BE49-F238E27FC236}">
+                <a16:creationId xmlns:a16="http://schemas.microsoft.com/office/drawing/2014/main" id="{E12EE66A-B072-4DFF-A24B-91471EE0E6FE}"/>
+              </a:ext>
+            </a:extLst>
+          </p:cNvPr>
+          <p:cNvSpPr txBox="1"/>
+          <p:nvPr/>
+        </p:nvSpPr>
+        <p:spPr>
+          <a:xfrm>
+            <a:off x="1153459" y="2067859"/>
+            <a:ext cx="4769223" cy="369332"/>
+          </a:xfrm>
+          <a:prstGeom prst="rect">
+            <a:avLst/>
+          </a:prstGeom>
+          <a:noFill/>
+        </p:spPr>
+        <p:txBody>
+          <a:bodyPr wrap="square" rtlCol="0">
+            <a:spAutoFit/>
+          </a:bodyPr>
+          <a:lstStyle/>
+          <a:p>
+            <a:pPr marL="285750" indent="-285750">
+              <a:buFont typeface="Arial" panose="020B0604020202020204" pitchFamily="34" charset="0"/>
+              <a:buChar char="•"/>
+            </a:pPr>
+            <a:r>
+              <a:rPr lang="en-US" dirty="0"/>
+              <a:t>Remember our outlier data from before….?</a:t>
+            </a:r>
+          </a:p>
+        </p:txBody>
+      </p:sp>
       <p:pic>
         <p:nvPicPr>
-          <p:cNvPr id="12" name="Content Placeholder 11" descr="Chart, scatter chart&#10;&#10;Description automatically generated">
-            <a:extLst>
-              <a:ext uri="{FF2B5EF4-FFF2-40B4-BE49-F238E27FC236}">
-                <a16:creationId xmlns:a16="http://schemas.microsoft.com/office/drawing/2014/main" id="{695BC367-B7C8-4BDE-9ADC-FC2D706DD9E1}"/>
+          <p:cNvPr id="13" name="Content Placeholder 12" descr="Chart, scatter chart&#10;&#10;Description automatically generated">
+            <a:extLst>
+              <a:ext uri="{FF2B5EF4-FFF2-40B4-BE49-F238E27FC236}">
+                <a16:creationId xmlns:a16="http://schemas.microsoft.com/office/drawing/2014/main" id="{36EC9719-9F63-4CC0-89D6-4ABD87A1496E}"/>
               </a:ext>
             </a:extLst>
           </p:cNvPr>
@@ -4214,15 +4254,67 @@
         </p:blipFill>
         <p:spPr>
           <a:xfrm>
-            <a:off x="6200726" y="2093457"/>
-            <a:ext cx="5153064" cy="3718167"/>
+            <a:off x="6780617" y="2906799"/>
+            <a:ext cx="4863281" cy="3140496"/>
           </a:xfrm>
         </p:spPr>
       </p:pic>
+      <p:sp>
+        <p:nvSpPr>
+          <p:cNvPr id="14" name="Star: 5 Points 13">
+            <a:extLst>
+              <a:ext uri="{FF2B5EF4-FFF2-40B4-BE49-F238E27FC236}">
+                <a16:creationId xmlns:a16="http://schemas.microsoft.com/office/drawing/2014/main" id="{4FFB4A48-0172-4F92-B19F-B400B70BC8FE}"/>
+              </a:ext>
+            </a:extLst>
+          </p:cNvPr>
+          <p:cNvSpPr/>
+          <p:nvPr/>
+        </p:nvSpPr>
+        <p:spPr>
+          <a:xfrm>
+            <a:off x="4834455" y="4011055"/>
+            <a:ext cx="763571" cy="805992"/>
+          </a:xfrm>
+          <a:prstGeom prst="star5">
+            <a:avLst/>
+          </a:prstGeom>
+          <a:noFill/>
+          <a:ln w="38100">
+            <a:solidFill>
+              <a:srgbClr val="FFC000"/>
+            </a:solidFill>
+          </a:ln>
+        </p:spPr>
+        <p:style>
+          <a:lnRef idx="2">
+            <a:schemeClr val="accent1">
+              <a:shade val="50000"/>
+            </a:schemeClr>
+          </a:lnRef>
+          <a:fillRef idx="1">
+            <a:schemeClr val="accent1"/>
+          </a:fillRef>
+          <a:effectRef idx="0">
+            <a:schemeClr val="accent1"/>
+          </a:effectRef>
+          <a:fontRef idx="minor">
+            <a:schemeClr val="lt1"/>
+          </a:fontRef>
+        </p:style>
+        <p:txBody>
+          <a:bodyPr rtlCol="0" anchor="ctr"/>
+          <a:lstStyle/>
+          <a:p>
+            <a:pPr algn="ctr"/>
+            <a:endParaRPr lang="en-US"/>
+          </a:p>
+        </p:txBody>
+      </p:sp>
     </p:spTree>
     <p:extLst>
       <p:ext uri="{BB962C8B-B14F-4D97-AF65-F5344CB8AC3E}">
-        <p14:creationId xmlns:p14="http://schemas.microsoft.com/office/powerpoint/2010/main" val="3390607523"/>
+        <p14:creationId xmlns:p14="http://schemas.microsoft.com/office/powerpoint/2010/main" val="3469790076"/>
       </p:ext>
     </p:extLst>
   </p:cSld>
@@ -4254,6 +4346,136 @@
           <p:cNvPr id="2" name="Title 1">
             <a:extLst>
               <a:ext uri="{FF2B5EF4-FFF2-40B4-BE49-F238E27FC236}">
+                <a16:creationId xmlns:a16="http://schemas.microsoft.com/office/drawing/2014/main" id="{AA3EEA82-22CE-4C57-B88A-29CBD65A8447}"/>
+              </a:ext>
+            </a:extLst>
+          </p:cNvPr>
+          <p:cNvSpPr>
+            <a:spLocks noGrp="1"/>
+          </p:cNvSpPr>
+          <p:nvPr>
+            <p:ph type="title"/>
+          </p:nvPr>
+        </p:nvSpPr>
+        <p:spPr/>
+        <p:txBody>
+          <a:bodyPr>
+            <a:normAutofit fontScale="90000"/>
+          </a:bodyPr>
+          <a:lstStyle/>
+          <a:p>
+            <a:r>
+              <a:rPr lang="en-US" dirty="0"/>
+              <a:t>How will the life expectancy be impacted by healthcare parameter?</a:t>
+            </a:r>
+          </a:p>
+        </p:txBody>
+      </p:sp>
+      <p:pic>
+        <p:nvPicPr>
+          <p:cNvPr id="10" name="Content Placeholder 9" descr="Chart, scatter chart&#10;&#10;Description automatically generated">
+            <a:extLst>
+              <a:ext uri="{FF2B5EF4-FFF2-40B4-BE49-F238E27FC236}">
+                <a16:creationId xmlns:a16="http://schemas.microsoft.com/office/drawing/2014/main" id="{50FB3BB5-21C7-4C38-BE9B-80F9E527CC8C}"/>
+              </a:ext>
+            </a:extLst>
+          </p:cNvPr>
+          <p:cNvPicPr>
+            <a:picLocks noGrp="1" noChangeAspect="1"/>
+          </p:cNvPicPr>
+          <p:nvPr>
+            <p:ph sz="half" idx="1"/>
+          </p:nvPr>
+        </p:nvPicPr>
+        <p:blipFill>
+          <a:blip r:embed="rId2">
+            <a:extLst>
+              <a:ext uri="{28A0092B-C50C-407E-A947-70E740481C1C}">
+                <a14:useLocalDpi xmlns:a14="http://schemas.microsoft.com/office/drawing/2010/main" val="0"/>
+              </a:ext>
+            </a:extLst>
+          </a:blip>
+          <a:stretch>
+            <a:fillRect/>
+          </a:stretch>
+        </p:blipFill>
+        <p:spPr>
+          <a:xfrm>
+            <a:off x="1097280" y="2093457"/>
+            <a:ext cx="4536164" cy="3718168"/>
+          </a:xfrm>
+        </p:spPr>
+      </p:pic>
+      <p:pic>
+        <p:nvPicPr>
+          <p:cNvPr id="12" name="Content Placeholder 11" descr="Chart, scatter chart&#10;&#10;Description automatically generated">
+            <a:extLst>
+              <a:ext uri="{FF2B5EF4-FFF2-40B4-BE49-F238E27FC236}">
+                <a16:creationId xmlns:a16="http://schemas.microsoft.com/office/drawing/2014/main" id="{695BC367-B7C8-4BDE-9ADC-FC2D706DD9E1}"/>
+              </a:ext>
+            </a:extLst>
+          </p:cNvPr>
+          <p:cNvPicPr>
+            <a:picLocks noGrp="1" noChangeAspect="1"/>
+          </p:cNvPicPr>
+          <p:nvPr>
+            <p:ph sz="half" idx="2"/>
+          </p:nvPr>
+        </p:nvPicPr>
+        <p:blipFill>
+          <a:blip r:embed="rId3">
+            <a:extLst>
+              <a:ext uri="{28A0092B-C50C-407E-A947-70E740481C1C}">
+                <a14:useLocalDpi xmlns:a14="http://schemas.microsoft.com/office/drawing/2010/main" val="0"/>
+              </a:ext>
+            </a:extLst>
+          </a:blip>
+          <a:stretch>
+            <a:fillRect/>
+          </a:stretch>
+        </p:blipFill>
+        <p:spPr>
+          <a:xfrm>
+            <a:off x="6200726" y="2093457"/>
+            <a:ext cx="5153064" cy="3718167"/>
+          </a:xfrm>
+        </p:spPr>
+      </p:pic>
+    </p:spTree>
+    <p:extLst>
+      <p:ext uri="{BB962C8B-B14F-4D97-AF65-F5344CB8AC3E}">
+        <p14:creationId xmlns:p14="http://schemas.microsoft.com/office/powerpoint/2010/main" val="3390607523"/>
+      </p:ext>
+    </p:extLst>
+  </p:cSld>
+  <p:clrMapOvr>
+    <a:masterClrMapping/>
+  </p:clrMapOvr>
+</p:sld>
+</file>
+
+<file path=ppt/slides/slide12.xml><?xml version="1.0" encoding="utf-8"?>
+<p:sld xmlns:a="http://schemas.openxmlformats.org/drawingml/2006/main" xmlns:r="http://schemas.openxmlformats.org/officeDocument/2006/relationships" xmlns:p="http://schemas.openxmlformats.org/presentationml/2006/main">
+  <p:cSld>
+    <p:spTree>
+      <p:nvGrpSpPr>
+        <p:cNvPr id="1" name=""/>
+        <p:cNvGrpSpPr/>
+        <p:nvPr/>
+      </p:nvGrpSpPr>
+      <p:grpSpPr>
+        <a:xfrm>
+          <a:off x="0" y="0"/>
+          <a:ext cx="0" cy="0"/>
+          <a:chOff x="0" y="0"/>
+          <a:chExt cx="0" cy="0"/>
+        </a:xfrm>
+      </p:grpSpPr>
+      <p:sp>
+        <p:nvSpPr>
+          <p:cNvPr id="2" name="Title 1">
+            <a:extLst>
+              <a:ext uri="{FF2B5EF4-FFF2-40B4-BE49-F238E27FC236}">
                 <a16:creationId xmlns:a16="http://schemas.microsoft.com/office/drawing/2014/main" id="{36DA183E-D4D5-4510-9316-022CD37A0CCC}"/>
               </a:ext>
             </a:extLst>
@@ -4362,7 +4584,7 @@
 </p:sld>
 </file>
 
-<file path=ppt/slides/slide12.xml><?xml version="1.0" encoding="utf-8"?>
+<file path=ppt/slides/slide13.xml><?xml version="1.0" encoding="utf-8"?>
 <p:sld xmlns:a="http://schemas.openxmlformats.org/drawingml/2006/main" xmlns:r="http://schemas.openxmlformats.org/officeDocument/2006/relationships" xmlns:p="http://schemas.openxmlformats.org/presentationml/2006/main">
   <p:cSld>
     <p:spTree>
@@ -4949,112 +5171,36 @@
           <a:chExt cx="0" cy="0"/>
         </a:xfrm>
       </p:grpSpPr>
-      <p:sp>
-        <p:nvSpPr>
-          <p:cNvPr id="2" name="Title 1">
-            <a:extLst>
-              <a:ext uri="{FF2B5EF4-FFF2-40B4-BE49-F238E27FC236}">
-                <a16:creationId xmlns:a16="http://schemas.microsoft.com/office/drawing/2014/main" id="{A953E0D4-21C3-4F5C-9272-020A4834C665}"/>
-              </a:ext>
-            </a:extLst>
-          </p:cNvPr>
-          <p:cNvSpPr>
-            <a:spLocks noGrp="1"/>
-          </p:cNvSpPr>
-          <p:nvPr>
-            <p:ph type="title"/>
-          </p:nvPr>
-        </p:nvSpPr>
-        <p:spPr>
-          <a:xfrm>
-            <a:off x="643466" y="786383"/>
-            <a:ext cx="3517567" cy="2093975"/>
-          </a:xfrm>
-        </p:spPr>
-        <p:txBody>
-          <a:bodyPr anchor="b">
-            <a:normAutofit/>
-          </a:bodyPr>
-          <a:lstStyle/>
-          <a:p>
-            <a:r>
-              <a:rPr lang="en-US" dirty="0"/>
-              <a:t>Dataset Selection</a:t>
-            </a:r>
-          </a:p>
-        </p:txBody>
-      </p:sp>
-      <p:sp>
-        <p:nvSpPr>
-          <p:cNvPr id="8" name="Text Placeholder 3">
-            <a:extLst>
-              <a:ext uri="{FF2B5EF4-FFF2-40B4-BE49-F238E27FC236}">
-                <a16:creationId xmlns:a16="http://schemas.microsoft.com/office/drawing/2014/main" id="{8824FE2F-9829-463A-BFBD-9FE082F21309}"/>
-              </a:ext>
-            </a:extLst>
-          </p:cNvPr>
-          <p:cNvSpPr>
-            <a:spLocks noGrp="1"/>
-          </p:cNvSpPr>
-          <p:nvPr>
-            <p:ph type="body" sz="half" idx="2"/>
-          </p:nvPr>
-        </p:nvSpPr>
-        <p:spPr>
-          <a:xfrm>
-            <a:off x="643465" y="3043050"/>
-            <a:ext cx="3517567" cy="3064505"/>
-          </a:xfrm>
-        </p:spPr>
-        <p:txBody>
-          <a:bodyPr/>
-          <a:lstStyle/>
-          <a:p>
-            <a:r>
-              <a:rPr lang="en-US" dirty="0"/>
-              <a:t>10 Datasets </a:t>
-            </a:r>
-          </a:p>
-          <a:p>
-            <a:r>
-              <a:rPr lang="en-US" dirty="0"/>
-              <a:t>1 Outcome Dataset</a:t>
-            </a:r>
-          </a:p>
-          <a:p>
-            <a:r>
-              <a:rPr lang="en-US" dirty="0"/>
-              <a:t>9 Societal Indicators</a:t>
-            </a:r>
-          </a:p>
-        </p:txBody>
-      </p:sp>
       <p:pic>
         <p:nvPicPr>
-          <p:cNvPr id="6" name="Content Placeholder 5">
-            <a:extLst>
-              <a:ext uri="{FF2B5EF4-FFF2-40B4-BE49-F238E27FC236}">
-                <a16:creationId xmlns:a16="http://schemas.microsoft.com/office/drawing/2014/main" id="{CE73C0C1-A4F0-4DCC-BEA4-EA879DAD1E55}"/>
+          <p:cNvPr id="7" name="Picture 6" descr="Map&#10;&#10;Description automatically generated">
+            <a:extLst>
+              <a:ext uri="{FF2B5EF4-FFF2-40B4-BE49-F238E27FC236}">
+                <a16:creationId xmlns:a16="http://schemas.microsoft.com/office/drawing/2014/main" id="{8C31EE53-B1E3-4F0A-8F21-682AC0F20C35}"/>
               </a:ext>
             </a:extLst>
           </p:cNvPr>
           <p:cNvPicPr>
-            <a:picLocks noGrp="1" noChangeAspect="1"/>
+            <a:picLocks noChangeAspect="1"/>
           </p:cNvPicPr>
-          <p:nvPr>
-            <p:ph idx="1"/>
-          </p:nvPr>
+          <p:nvPr/>
         </p:nvPicPr>
         <p:blipFill>
-          <a:blip r:embed="rId2"/>
+          <a:blip r:embed="rId2">
+            <a:extLst>
+              <a:ext uri="{28A0092B-C50C-407E-A947-70E740481C1C}">
+                <a14:useLocalDpi xmlns:a14="http://schemas.microsoft.com/office/drawing/2010/main" val="0"/>
+              </a:ext>
+            </a:extLst>
+          </a:blip>
           <a:stretch>
             <a:fillRect/>
           </a:stretch>
         </p:blipFill>
         <p:spPr>
           <a:xfrm>
-            <a:off x="4830306" y="1409307"/>
-            <a:ext cx="7100578" cy="3516198"/>
+            <a:off x="0" y="312155"/>
+            <a:ext cx="12192000" cy="6063478"/>
           </a:xfrm>
           <a:prstGeom prst="rect">
             <a:avLst/>
@@ -5064,7 +5210,7 @@
     </p:spTree>
     <p:extLst>
       <p:ext uri="{BB962C8B-B14F-4D97-AF65-F5344CB8AC3E}">
-        <p14:creationId xmlns:p14="http://schemas.microsoft.com/office/powerpoint/2010/main" val="129229627"/>
+        <p14:creationId xmlns:p14="http://schemas.microsoft.com/office/powerpoint/2010/main" val="3606835693"/>
       </p:ext>
     </p:extLst>
   </p:cSld>
@@ -5096,7 +5242,7 @@
           <p:cNvPr id="2" name="Title 1">
             <a:extLst>
               <a:ext uri="{FF2B5EF4-FFF2-40B4-BE49-F238E27FC236}">
-                <a16:creationId xmlns:a16="http://schemas.microsoft.com/office/drawing/2014/main" id="{CF92AFBE-870A-4BF7-BC92-0086C62673DC}"/>
+                <a16:creationId xmlns:a16="http://schemas.microsoft.com/office/drawing/2014/main" id="{A953E0D4-21C3-4F5C-9272-020A4834C665}"/>
               </a:ext>
             </a:extLst>
           </p:cNvPr>
@@ -5107,158 +5253,76 @@
             <p:ph type="title"/>
           </p:nvPr>
         </p:nvSpPr>
-        <p:spPr/>
-        <p:txBody>
-          <a:bodyPr/>
-          <a:lstStyle/>
-          <a:p>
-            <a:r>
-              <a:rPr lang="en-US" dirty="0"/>
-              <a:t>Data Exploration/Cleansing</a:t>
-            </a:r>
-          </a:p>
-        </p:txBody>
-      </p:sp>
-      <p:sp>
-        <p:nvSpPr>
-          <p:cNvPr id="4" name="Content Placeholder 3">
-            <a:extLst>
-              <a:ext uri="{FF2B5EF4-FFF2-40B4-BE49-F238E27FC236}">
-                <a16:creationId xmlns:a16="http://schemas.microsoft.com/office/drawing/2014/main" id="{CD8E3C5D-77F9-4458-9F50-C2D55AB0F9FF}"/>
-              </a:ext>
-            </a:extLst>
-          </p:cNvPr>
-          <p:cNvSpPr>
-            <a:spLocks noGrp="1"/>
-          </p:cNvSpPr>
-          <p:nvPr>
-            <p:ph sz="half" idx="1"/>
-          </p:nvPr>
-        </p:nvSpPr>
-        <p:spPr/>
-        <p:txBody>
-          <a:bodyPr>
+        <p:spPr>
+          <a:xfrm>
+            <a:off x="643466" y="786383"/>
+            <a:ext cx="3517567" cy="2093975"/>
+          </a:xfrm>
+        </p:spPr>
+        <p:txBody>
+          <a:bodyPr anchor="b">
             <a:normAutofit/>
           </a:bodyPr>
           <a:lstStyle/>
           <a:p>
-            <a:pPr>
-              <a:buFont typeface="Arial" panose="020B0604020202020204" pitchFamily="34" charset="0"/>
-              <a:buChar char="•"/>
-            </a:pPr>
             <a:r>
               <a:rPr lang="en-US" dirty="0"/>
-              <a:t> Text to columns on some of the UN datasets </a:t>
-            </a:r>
-          </a:p>
-          <a:p>
-            <a:pPr>
-              <a:buFont typeface="Arial" panose="020B0604020202020204" pitchFamily="34" charset="0"/>
-              <a:buChar char="•"/>
-            </a:pPr>
+              <a:t>Dataset Selection</a:t>
+            </a:r>
+          </a:p>
+        </p:txBody>
+      </p:sp>
+      <p:sp>
+        <p:nvSpPr>
+          <p:cNvPr id="8" name="Text Placeholder 3">
+            <a:extLst>
+              <a:ext uri="{FF2B5EF4-FFF2-40B4-BE49-F238E27FC236}">
+                <a16:creationId xmlns:a16="http://schemas.microsoft.com/office/drawing/2014/main" id="{8824FE2F-9829-463A-BFBD-9FE082F21309}"/>
+              </a:ext>
+            </a:extLst>
+          </p:cNvPr>
+          <p:cNvSpPr>
+            <a:spLocks noGrp="1"/>
+          </p:cNvSpPr>
+          <p:nvPr>
+            <p:ph type="body" sz="half" idx="2"/>
+          </p:nvPr>
+        </p:nvSpPr>
+        <p:spPr>
+          <a:xfrm>
+            <a:off x="643465" y="3043050"/>
+            <a:ext cx="3517567" cy="3064505"/>
+          </a:xfrm>
+        </p:spPr>
+        <p:txBody>
+          <a:bodyPr/>
+          <a:lstStyle/>
+          <a:p>
             <a:r>
               <a:rPr lang="en-US" dirty="0"/>
-              <a:t> .rename(columns={……</a:t>
-            </a:r>
-          </a:p>
-          <a:p>
-            <a:pPr>
-              <a:buFont typeface="Arial" panose="020B0604020202020204" pitchFamily="34" charset="0"/>
-              <a:buChar char="•"/>
-            </a:pPr>
+              <a:t>10 Datasets </a:t>
+            </a:r>
+          </a:p>
+          <a:p>
             <a:r>
               <a:rPr lang="en-US" dirty="0"/>
-              <a:t>.columns = [‘</a:t>
-            </a:r>
-            <a:r>
-              <a:rPr lang="en-US" dirty="0" err="1"/>
-              <a:t>xxxxxx</a:t>
-            </a:r>
+              <a:t>1 Outcome Dataset</a:t>
+            </a:r>
+          </a:p>
+          <a:p>
             <a:r>
               <a:rPr lang="en-US" dirty="0"/>
-              <a:t>’,’</a:t>
-            </a:r>
-            <a:r>
-              <a:rPr lang="en-US" dirty="0" err="1"/>
-              <a:t>bbbbb</a:t>
-            </a:r>
-            <a:r>
-              <a:rPr lang="en-US" dirty="0"/>
-              <a:t>’,’</a:t>
-            </a:r>
-            <a:r>
-              <a:rPr lang="en-US" dirty="0" err="1"/>
-              <a:t>aaaaa</a:t>
-            </a:r>
-            <a:r>
-              <a:rPr lang="en-US" dirty="0"/>
-              <a:t>’]</a:t>
-            </a:r>
-          </a:p>
-          <a:p>
-            <a:pPr>
-              <a:buFont typeface="Arial" panose="020B0604020202020204" pitchFamily="34" charset="0"/>
-              <a:buChar char="•"/>
-            </a:pPr>
-            <a:r>
-              <a:rPr lang="en-US" dirty="0"/>
-              <a:t> .</a:t>
-            </a:r>
-            <a:r>
-              <a:rPr lang="en-US" dirty="0" err="1"/>
-              <a:t>value_counts</a:t>
-            </a:r>
-            <a:r>
-              <a:rPr lang="en-US" dirty="0"/>
-              <a:t>()</a:t>
-            </a:r>
-          </a:p>
-          <a:p>
-            <a:pPr>
-              <a:buFont typeface="Arial" panose="020B0604020202020204" pitchFamily="34" charset="0"/>
-              <a:buChar char="•"/>
-            </a:pPr>
-            <a:r>
-              <a:rPr lang="en-US" dirty="0"/>
-              <a:t> Outlier Analysis – Boxplots, scatter plots</a:t>
-            </a:r>
-          </a:p>
-          <a:p>
-            <a:pPr>
-              <a:buFont typeface="Arial" panose="020B0604020202020204" pitchFamily="34" charset="0"/>
-              <a:buChar char="•"/>
-            </a:pPr>
-            <a:r>
-              <a:rPr lang="en-US" dirty="0"/>
-              <a:t> </a:t>
-            </a:r>
-            <a:r>
-              <a:rPr lang="en-US" dirty="0" err="1"/>
-              <a:t>pd.merge</a:t>
-            </a:r>
-            <a:r>
-              <a:rPr lang="en-US" dirty="0"/>
-              <a:t>(a, b, on=‘Entity’)</a:t>
-            </a:r>
-          </a:p>
-          <a:p>
-            <a:pPr lvl="1">
-              <a:buFont typeface="Arial" panose="020B0604020202020204" pitchFamily="34" charset="0"/>
-              <a:buChar char="•"/>
-            </a:pPr>
-            <a:r>
-              <a:rPr lang="en-US" dirty="0"/>
-              <a:t>Joined only datapoints that shared common country information, dropped extraneous data</a:t>
+              <a:t>9 Societal Indicators</a:t>
             </a:r>
           </a:p>
         </p:txBody>
       </p:sp>
       <p:pic>
         <p:nvPicPr>
-          <p:cNvPr id="7" name="Content Placeholder 6" descr="Outlier analysis for 2019 life expectancy data">
-            <a:extLst>
-              <a:ext uri="{FF2B5EF4-FFF2-40B4-BE49-F238E27FC236}">
-                <a16:creationId xmlns:a16="http://schemas.microsoft.com/office/drawing/2014/main" id="{31E63C13-3F69-44BF-B0CF-3B1474817EA0}"/>
+          <p:cNvPr id="6" name="Content Placeholder 5">
+            <a:extLst>
+              <a:ext uri="{FF2B5EF4-FFF2-40B4-BE49-F238E27FC236}">
+                <a16:creationId xmlns:a16="http://schemas.microsoft.com/office/drawing/2014/main" id="{CE73C0C1-A4F0-4DCC-BEA4-EA879DAD1E55}"/>
               </a:ext>
             </a:extLst>
           </p:cNvPr>
@@ -5266,32 +5330,29 @@
             <a:picLocks noGrp="1" noChangeAspect="1"/>
           </p:cNvPicPr>
           <p:nvPr>
-            <p:ph sz="half" idx="2"/>
+            <p:ph idx="1"/>
           </p:nvPr>
         </p:nvPicPr>
         <p:blipFill>
-          <a:blip r:embed="rId2">
-            <a:extLst>
-              <a:ext uri="{28A0092B-C50C-407E-A947-70E740481C1C}">
-                <a14:useLocalDpi xmlns:a14="http://schemas.microsoft.com/office/drawing/2010/main" val="0"/>
-              </a:ext>
-            </a:extLst>
-          </a:blip>
+          <a:blip r:embed="rId2"/>
           <a:stretch>
             <a:fillRect/>
           </a:stretch>
         </p:blipFill>
         <p:spPr>
           <a:xfrm>
-            <a:off x="6096000" y="2120900"/>
-            <a:ext cx="5928358" cy="2708088"/>
-          </a:xfrm>
+            <a:off x="4830306" y="1409307"/>
+            <a:ext cx="7100578" cy="3516198"/>
+          </a:xfrm>
+          <a:prstGeom prst="rect">
+            <a:avLst/>
+          </a:prstGeom>
         </p:spPr>
       </p:pic>
     </p:spTree>
     <p:extLst>
       <p:ext uri="{BB962C8B-B14F-4D97-AF65-F5344CB8AC3E}">
-        <p14:creationId xmlns:p14="http://schemas.microsoft.com/office/powerpoint/2010/main" val="2761713227"/>
+        <p14:creationId xmlns:p14="http://schemas.microsoft.com/office/powerpoint/2010/main" val="129229627"/>
       </p:ext>
     </p:extLst>
   </p:cSld>
@@ -5346,12 +5407,146 @@
           </a:p>
         </p:txBody>
       </p:sp>
+      <p:sp>
+        <p:nvSpPr>
+          <p:cNvPr id="4" name="Content Placeholder 3">
+            <a:extLst>
+              <a:ext uri="{FF2B5EF4-FFF2-40B4-BE49-F238E27FC236}">
+                <a16:creationId xmlns:a16="http://schemas.microsoft.com/office/drawing/2014/main" id="{CD8E3C5D-77F9-4458-9F50-C2D55AB0F9FF}"/>
+              </a:ext>
+            </a:extLst>
+          </p:cNvPr>
+          <p:cNvSpPr>
+            <a:spLocks noGrp="1"/>
+          </p:cNvSpPr>
+          <p:nvPr>
+            <p:ph sz="half" idx="1"/>
+          </p:nvPr>
+        </p:nvSpPr>
+        <p:spPr/>
+        <p:txBody>
+          <a:bodyPr>
+            <a:normAutofit/>
+          </a:bodyPr>
+          <a:lstStyle/>
+          <a:p>
+            <a:pPr>
+              <a:buFont typeface="Arial" panose="020B0604020202020204" pitchFamily="34" charset="0"/>
+              <a:buChar char="•"/>
+            </a:pPr>
+            <a:r>
+              <a:rPr lang="en-US" dirty="0"/>
+              <a:t> Text to columns on some of the UN datasets </a:t>
+            </a:r>
+          </a:p>
+          <a:p>
+            <a:pPr>
+              <a:buFont typeface="Arial" panose="020B0604020202020204" pitchFamily="34" charset="0"/>
+              <a:buChar char="•"/>
+            </a:pPr>
+            <a:r>
+              <a:rPr lang="en-US" dirty="0"/>
+              <a:t> .rename(columns={……</a:t>
+            </a:r>
+          </a:p>
+          <a:p>
+            <a:pPr>
+              <a:buFont typeface="Arial" panose="020B0604020202020204" pitchFamily="34" charset="0"/>
+              <a:buChar char="•"/>
+            </a:pPr>
+            <a:r>
+              <a:rPr lang="en-US" dirty="0"/>
+              <a:t>.columns = [‘</a:t>
+            </a:r>
+            <a:r>
+              <a:rPr lang="en-US" dirty="0" err="1"/>
+              <a:t>xxxxxx</a:t>
+            </a:r>
+            <a:r>
+              <a:rPr lang="en-US" dirty="0"/>
+              <a:t>’,’</a:t>
+            </a:r>
+            <a:r>
+              <a:rPr lang="en-US" dirty="0" err="1"/>
+              <a:t>bbbbb</a:t>
+            </a:r>
+            <a:r>
+              <a:rPr lang="en-US" dirty="0"/>
+              <a:t>’,’</a:t>
+            </a:r>
+            <a:r>
+              <a:rPr lang="en-US" dirty="0" err="1"/>
+              <a:t>aaaaa</a:t>
+            </a:r>
+            <a:r>
+              <a:rPr lang="en-US" dirty="0"/>
+              <a:t>’]</a:t>
+            </a:r>
+          </a:p>
+          <a:p>
+            <a:pPr>
+              <a:buFont typeface="Arial" panose="020B0604020202020204" pitchFamily="34" charset="0"/>
+              <a:buChar char="•"/>
+            </a:pPr>
+            <a:r>
+              <a:rPr lang="en-US" dirty="0"/>
+              <a:t> .</a:t>
+            </a:r>
+            <a:r>
+              <a:rPr lang="en-US" dirty="0" err="1"/>
+              <a:t>value_counts</a:t>
+            </a:r>
+            <a:r>
+              <a:rPr lang="en-US" dirty="0"/>
+              <a:t>()</a:t>
+            </a:r>
+          </a:p>
+          <a:p>
+            <a:pPr>
+              <a:buFont typeface="Arial" panose="020B0604020202020204" pitchFamily="34" charset="0"/>
+              <a:buChar char="•"/>
+            </a:pPr>
+            <a:r>
+              <a:rPr lang="en-US" dirty="0"/>
+              <a:t> Outlier Analysis – Boxplots, scatter plots</a:t>
+            </a:r>
+          </a:p>
+          <a:p>
+            <a:pPr>
+              <a:buFont typeface="Arial" panose="020B0604020202020204" pitchFamily="34" charset="0"/>
+              <a:buChar char="•"/>
+            </a:pPr>
+            <a:r>
+              <a:rPr lang="en-US" dirty="0"/>
+              <a:t> </a:t>
+            </a:r>
+            <a:r>
+              <a:rPr lang="en-US" dirty="0" err="1"/>
+              <a:t>pd.merge</a:t>
+            </a:r>
+            <a:r>
+              <a:rPr lang="en-US" dirty="0"/>
+              <a:t>(a, b, on=‘Entity’)</a:t>
+            </a:r>
+          </a:p>
+          <a:p>
+            <a:pPr lvl="1">
+              <a:buFont typeface="Arial" panose="020B0604020202020204" pitchFamily="34" charset="0"/>
+              <a:buChar char="•"/>
+            </a:pPr>
+            <a:r>
+              <a:rPr lang="en-US" dirty="0"/>
+              <a:t>Joined only datapoints that shared common country information, dropped extraneous data</a:t>
+            </a:r>
+          </a:p>
+        </p:txBody>
+      </p:sp>
       <p:pic>
         <p:nvPicPr>
-          <p:cNvPr id="10" name="Content Placeholder 9" descr="Graphical user interface, text, application&#10;&#10;Description automatically generated">
-            <a:extLst>
-              <a:ext uri="{FF2B5EF4-FFF2-40B4-BE49-F238E27FC236}">
-                <a16:creationId xmlns:a16="http://schemas.microsoft.com/office/drawing/2014/main" id="{8693FB52-2B61-4AF9-9B73-CE9B769B1A49}"/>
+          <p:cNvPr id="7" name="Content Placeholder 6" descr="Outlier analysis for 2019 life expectancy data">
+            <a:extLst>
+              <a:ext uri="{FF2B5EF4-FFF2-40B4-BE49-F238E27FC236}">
+                <a16:creationId xmlns:a16="http://schemas.microsoft.com/office/drawing/2014/main" id="{31E63C13-3F69-44BF-B0CF-3B1474817EA0}"/>
               </a:ext>
             </a:extLst>
           </p:cNvPr>
@@ -5376,102 +5571,15 @@
         </p:blipFill>
         <p:spPr>
           <a:xfrm>
-            <a:off x="6855803" y="2028703"/>
-            <a:ext cx="4421797" cy="3735657"/>
+            <a:off x="6096000" y="2120900"/>
+            <a:ext cx="5928358" cy="2708088"/>
           </a:xfrm>
         </p:spPr>
       </p:pic>
-      <p:pic>
-        <p:nvPicPr>
-          <p:cNvPr id="14" name="Content Placeholder 13" descr="Text, table&#10;&#10;Description automatically generated">
-            <a:extLst>
-              <a:ext uri="{FF2B5EF4-FFF2-40B4-BE49-F238E27FC236}">
-                <a16:creationId xmlns:a16="http://schemas.microsoft.com/office/drawing/2014/main" id="{EA7B6F9D-C464-4F3A-AF16-049B4D7EE508}"/>
-              </a:ext>
-            </a:extLst>
-          </p:cNvPr>
-          <p:cNvPicPr>
-            <a:picLocks noGrp="1" noChangeAspect="1"/>
-          </p:cNvPicPr>
-          <p:nvPr>
-            <p:ph sz="half" idx="1"/>
-          </p:nvPr>
-        </p:nvPicPr>
-        <p:blipFill>
-          <a:blip r:embed="rId3">
-            <a:extLst>
-              <a:ext uri="{28A0092B-C50C-407E-A947-70E740481C1C}">
-                <a14:useLocalDpi xmlns:a14="http://schemas.microsoft.com/office/drawing/2010/main" val="0"/>
-              </a:ext>
-            </a:extLst>
-          </a:blip>
-          <a:stretch>
-            <a:fillRect/>
-          </a:stretch>
-        </p:blipFill>
-        <p:spPr>
-          <a:xfrm>
-            <a:off x="1097280" y="2718100"/>
-            <a:ext cx="5369890" cy="2402541"/>
-          </a:xfrm>
-        </p:spPr>
-      </p:pic>
-      <p:sp>
-        <p:nvSpPr>
-          <p:cNvPr id="15" name="Rectangle 14">
-            <a:extLst>
-              <a:ext uri="{FF2B5EF4-FFF2-40B4-BE49-F238E27FC236}">
-                <a16:creationId xmlns:a16="http://schemas.microsoft.com/office/drawing/2014/main" id="{185D80E9-5831-429D-83A3-C197E8E21252}"/>
-              </a:ext>
-            </a:extLst>
-          </p:cNvPr>
-          <p:cNvSpPr/>
-          <p:nvPr/>
-        </p:nvSpPr>
-        <p:spPr>
-          <a:xfrm>
-            <a:off x="5509726" y="3242389"/>
-            <a:ext cx="802433" cy="1035698"/>
-          </a:xfrm>
-          <a:prstGeom prst="rect">
-            <a:avLst/>
-          </a:prstGeom>
-          <a:noFill/>
-          <a:ln w="28575">
-            <a:solidFill>
-              <a:srgbClr val="0070C0"/>
-            </a:solidFill>
-          </a:ln>
-        </p:spPr>
-        <p:style>
-          <a:lnRef idx="2">
-            <a:schemeClr val="accent1">
-              <a:shade val="50000"/>
-            </a:schemeClr>
-          </a:lnRef>
-          <a:fillRef idx="1">
-            <a:schemeClr val="accent1"/>
-          </a:fillRef>
-          <a:effectRef idx="0">
-            <a:schemeClr val="accent1"/>
-          </a:effectRef>
-          <a:fontRef idx="minor">
-            <a:schemeClr val="lt1"/>
-          </a:fontRef>
-        </p:style>
-        <p:txBody>
-          <a:bodyPr rtlCol="0" anchor="ctr"/>
-          <a:lstStyle/>
-          <a:p>
-            <a:pPr algn="ctr"/>
-            <a:endParaRPr lang="en-US"/>
-          </a:p>
-        </p:txBody>
-      </p:sp>
     </p:spTree>
     <p:extLst>
       <p:ext uri="{BB962C8B-B14F-4D97-AF65-F5344CB8AC3E}">
-        <p14:creationId xmlns:p14="http://schemas.microsoft.com/office/powerpoint/2010/main" val="2996702516"/>
+        <p14:creationId xmlns:p14="http://schemas.microsoft.com/office/powerpoint/2010/main" val="2761713227"/>
       </p:ext>
     </p:extLst>
   </p:cSld>
@@ -5503,7 +5611,7 @@
           <p:cNvPr id="2" name="Title 1">
             <a:extLst>
               <a:ext uri="{FF2B5EF4-FFF2-40B4-BE49-F238E27FC236}">
-                <a16:creationId xmlns:a16="http://schemas.microsoft.com/office/drawing/2014/main" id="{21AE1ED8-3E39-470D-85F8-A5C59111D326}"/>
+                <a16:creationId xmlns:a16="http://schemas.microsoft.com/office/drawing/2014/main" id="{CF92AFBE-870A-4BF7-BC92-0086C62673DC}"/>
               </a:ext>
             </a:extLst>
           </p:cNvPr>
@@ -5521,71 +5629,17 @@
           <a:p>
             <a:r>
               <a:rPr lang="en-US" dirty="0"/>
-              <a:t>Data Analysis</a:t>
-            </a:r>
-          </a:p>
-        </p:txBody>
-      </p:sp>
-      <p:sp>
-        <p:nvSpPr>
-          <p:cNvPr id="3" name="Content Placeholder 2">
-            <a:extLst>
-              <a:ext uri="{FF2B5EF4-FFF2-40B4-BE49-F238E27FC236}">
-                <a16:creationId xmlns:a16="http://schemas.microsoft.com/office/drawing/2014/main" id="{50478E0A-AF5B-43E6-A087-15D70A12E2B2}"/>
-              </a:ext>
-            </a:extLst>
-          </p:cNvPr>
-          <p:cNvSpPr>
-            <a:spLocks noGrp="1"/>
-          </p:cNvSpPr>
-          <p:nvPr>
-            <p:ph sz="half" idx="1"/>
-          </p:nvPr>
-        </p:nvSpPr>
-        <p:spPr>
-          <a:xfrm>
-            <a:off x="1526390" y="2061137"/>
-            <a:ext cx="9200180" cy="1572558"/>
-          </a:xfrm>
-        </p:spPr>
-        <p:txBody>
-          <a:bodyPr/>
-          <a:lstStyle/>
-          <a:p>
-            <a:r>
-              <a:rPr lang="en-US" dirty="0"/>
-              <a:t>Scatter Plots – Societal Indicator vs Life Expectancy</a:t>
-            </a:r>
-          </a:p>
-          <a:p>
-            <a:pPr lvl="1"/>
-            <a:r>
-              <a:rPr lang="en-US" dirty="0"/>
-              <a:t>Run linear regression</a:t>
-            </a:r>
-          </a:p>
-          <a:p>
-            <a:pPr lvl="1"/>
-            <a:r>
-              <a:rPr lang="en-US" dirty="0"/>
-              <a:t>Measure correlation coefficient</a:t>
-            </a:r>
-          </a:p>
-          <a:p>
-            <a:pPr lvl="1"/>
-            <a:r>
-              <a:rPr lang="en-US" dirty="0"/>
-              <a:t>Visually inspect to determine if any non-linear relationships may be occurring</a:t>
+              <a:t>Data Exploration/Cleansing</a:t>
             </a:r>
           </a:p>
         </p:txBody>
       </p:sp>
       <p:pic>
         <p:nvPicPr>
-          <p:cNvPr id="6" name="Content Placeholder 5" descr="Text&#10;&#10;Description automatically generated">
-            <a:extLst>
-              <a:ext uri="{FF2B5EF4-FFF2-40B4-BE49-F238E27FC236}">
-                <a16:creationId xmlns:a16="http://schemas.microsoft.com/office/drawing/2014/main" id="{B96CB27C-135A-4450-BFF1-E6263D57C740}"/>
+          <p:cNvPr id="10" name="Content Placeholder 9" descr="Graphical user interface, text, application&#10;&#10;Description automatically generated">
+            <a:extLst>
+              <a:ext uri="{FF2B5EF4-FFF2-40B4-BE49-F238E27FC236}">
+                <a16:creationId xmlns:a16="http://schemas.microsoft.com/office/drawing/2014/main" id="{8693FB52-2B61-4AF9-9B73-CE9B769B1A49}"/>
               </a:ext>
             </a:extLst>
           </p:cNvPr>
@@ -5610,15 +5664,102 @@
         </p:blipFill>
         <p:spPr>
           <a:xfrm>
-            <a:off x="1882390" y="3633695"/>
-            <a:ext cx="8427220" cy="2665353"/>
+            <a:off x="6855803" y="2028703"/>
+            <a:ext cx="4421797" cy="3735657"/>
           </a:xfrm>
         </p:spPr>
       </p:pic>
+      <p:pic>
+        <p:nvPicPr>
+          <p:cNvPr id="14" name="Content Placeholder 13" descr="Text, table&#10;&#10;Description automatically generated">
+            <a:extLst>
+              <a:ext uri="{FF2B5EF4-FFF2-40B4-BE49-F238E27FC236}">
+                <a16:creationId xmlns:a16="http://schemas.microsoft.com/office/drawing/2014/main" id="{EA7B6F9D-C464-4F3A-AF16-049B4D7EE508}"/>
+              </a:ext>
+            </a:extLst>
+          </p:cNvPr>
+          <p:cNvPicPr>
+            <a:picLocks noGrp="1" noChangeAspect="1"/>
+          </p:cNvPicPr>
+          <p:nvPr>
+            <p:ph sz="half" idx="1"/>
+          </p:nvPr>
+        </p:nvPicPr>
+        <p:blipFill>
+          <a:blip r:embed="rId3">
+            <a:extLst>
+              <a:ext uri="{28A0092B-C50C-407E-A947-70E740481C1C}">
+                <a14:useLocalDpi xmlns:a14="http://schemas.microsoft.com/office/drawing/2010/main" val="0"/>
+              </a:ext>
+            </a:extLst>
+          </a:blip>
+          <a:stretch>
+            <a:fillRect/>
+          </a:stretch>
+        </p:blipFill>
+        <p:spPr>
+          <a:xfrm>
+            <a:off x="1097280" y="2718100"/>
+            <a:ext cx="5369890" cy="2402541"/>
+          </a:xfrm>
+        </p:spPr>
+      </p:pic>
+      <p:sp>
+        <p:nvSpPr>
+          <p:cNvPr id="15" name="Rectangle 14">
+            <a:extLst>
+              <a:ext uri="{FF2B5EF4-FFF2-40B4-BE49-F238E27FC236}">
+                <a16:creationId xmlns:a16="http://schemas.microsoft.com/office/drawing/2014/main" id="{185D80E9-5831-429D-83A3-C197E8E21252}"/>
+              </a:ext>
+            </a:extLst>
+          </p:cNvPr>
+          <p:cNvSpPr/>
+          <p:nvPr/>
+        </p:nvSpPr>
+        <p:spPr>
+          <a:xfrm>
+            <a:off x="5509726" y="3242389"/>
+            <a:ext cx="802433" cy="1035698"/>
+          </a:xfrm>
+          <a:prstGeom prst="rect">
+            <a:avLst/>
+          </a:prstGeom>
+          <a:noFill/>
+          <a:ln w="28575">
+            <a:solidFill>
+              <a:srgbClr val="0070C0"/>
+            </a:solidFill>
+          </a:ln>
+        </p:spPr>
+        <p:style>
+          <a:lnRef idx="2">
+            <a:schemeClr val="accent1">
+              <a:shade val="50000"/>
+            </a:schemeClr>
+          </a:lnRef>
+          <a:fillRef idx="1">
+            <a:schemeClr val="accent1"/>
+          </a:fillRef>
+          <a:effectRef idx="0">
+            <a:schemeClr val="accent1"/>
+          </a:effectRef>
+          <a:fontRef idx="minor">
+            <a:schemeClr val="lt1"/>
+          </a:fontRef>
+        </p:style>
+        <p:txBody>
+          <a:bodyPr rtlCol="0" anchor="ctr"/>
+          <a:lstStyle/>
+          <a:p>
+            <a:pPr algn="ctr"/>
+            <a:endParaRPr lang="en-US"/>
+          </a:p>
+        </p:txBody>
+      </p:sp>
     </p:spTree>
     <p:extLst>
       <p:ext uri="{BB962C8B-B14F-4D97-AF65-F5344CB8AC3E}">
-        <p14:creationId xmlns:p14="http://schemas.microsoft.com/office/powerpoint/2010/main" val="2343329347"/>
+        <p14:creationId xmlns:p14="http://schemas.microsoft.com/office/powerpoint/2010/main" val="2996702516"/>
       </p:ext>
     </p:extLst>
   </p:cSld>
@@ -5650,7 +5791,7 @@
           <p:cNvPr id="2" name="Title 1">
             <a:extLst>
               <a:ext uri="{FF2B5EF4-FFF2-40B4-BE49-F238E27FC236}">
-                <a16:creationId xmlns:a16="http://schemas.microsoft.com/office/drawing/2014/main" id="{01F8B8F7-CC64-46B2-B625-E8DDB7A58B46}"/>
+                <a16:creationId xmlns:a16="http://schemas.microsoft.com/office/drawing/2014/main" id="{21AE1ED8-3E39-470D-85F8-A5C59111D326}"/>
               </a:ext>
             </a:extLst>
           </p:cNvPr>
@@ -5663,24 +5804,76 @@
         </p:nvSpPr>
         <p:spPr/>
         <p:txBody>
-          <a:bodyPr>
-            <a:normAutofit fontScale="90000"/>
-          </a:bodyPr>
+          <a:bodyPr/>
           <a:lstStyle/>
           <a:p>
             <a:r>
               <a:rPr lang="en-US" dirty="0"/>
-              <a:t>How will the life expectancy be impacted by education parameter?</a:t>
+              <a:t>Data Analysis</a:t>
+            </a:r>
+          </a:p>
+        </p:txBody>
+      </p:sp>
+      <p:sp>
+        <p:nvSpPr>
+          <p:cNvPr id="3" name="Content Placeholder 2">
+            <a:extLst>
+              <a:ext uri="{FF2B5EF4-FFF2-40B4-BE49-F238E27FC236}">
+                <a16:creationId xmlns:a16="http://schemas.microsoft.com/office/drawing/2014/main" id="{50478E0A-AF5B-43E6-A087-15D70A12E2B2}"/>
+              </a:ext>
+            </a:extLst>
+          </p:cNvPr>
+          <p:cNvSpPr>
+            <a:spLocks noGrp="1"/>
+          </p:cNvSpPr>
+          <p:nvPr>
+            <p:ph sz="half" idx="1"/>
+          </p:nvPr>
+        </p:nvSpPr>
+        <p:spPr>
+          <a:xfrm>
+            <a:off x="1526390" y="2061137"/>
+            <a:ext cx="9200180" cy="1572558"/>
+          </a:xfrm>
+        </p:spPr>
+        <p:txBody>
+          <a:bodyPr/>
+          <a:lstStyle/>
+          <a:p>
+            <a:r>
+              <a:rPr lang="en-US" dirty="0"/>
+              <a:t>Scatter Plots – Societal Indicator vs Life Expectancy</a:t>
+            </a:r>
+          </a:p>
+          <a:p>
+            <a:pPr lvl="1"/>
+            <a:r>
+              <a:rPr lang="en-US" dirty="0"/>
+              <a:t>Run linear regression</a:t>
+            </a:r>
+          </a:p>
+          <a:p>
+            <a:pPr lvl="1"/>
+            <a:r>
+              <a:rPr lang="en-US" dirty="0"/>
+              <a:t>Measure correlation coefficient</a:t>
+            </a:r>
+          </a:p>
+          <a:p>
+            <a:pPr lvl="1"/>
+            <a:r>
+              <a:rPr lang="en-US" dirty="0"/>
+              <a:t>Visually inspect to determine if any non-linear relationships may be occurring</a:t>
             </a:r>
           </a:p>
         </p:txBody>
       </p:sp>
       <p:pic>
         <p:nvPicPr>
-          <p:cNvPr id="8" name="Content Placeholder 7" descr="Chart, scatter chart&#10;&#10;Description automatically generated">
-            <a:extLst>
-              <a:ext uri="{FF2B5EF4-FFF2-40B4-BE49-F238E27FC236}">
-                <a16:creationId xmlns:a16="http://schemas.microsoft.com/office/drawing/2014/main" id="{6360C479-A933-4CB7-9F6C-2AC0AF20728D}"/>
+          <p:cNvPr id="6" name="Content Placeholder 5" descr="Text&#10;&#10;Description automatically generated">
+            <a:extLst>
+              <a:ext uri="{FF2B5EF4-FFF2-40B4-BE49-F238E27FC236}">
+                <a16:creationId xmlns:a16="http://schemas.microsoft.com/office/drawing/2014/main" id="{B96CB27C-135A-4450-BFF1-E6263D57C740}"/>
               </a:ext>
             </a:extLst>
           </p:cNvPr>
@@ -5688,7 +5881,7 @@
             <a:picLocks noGrp="1" noChangeAspect="1"/>
           </p:cNvPicPr>
           <p:nvPr>
-            <p:ph sz="half" idx="1"/>
+            <p:ph sz="half" idx="2"/>
           </p:nvPr>
         </p:nvPicPr>
         <p:blipFill>
@@ -5705,86 +5898,15 @@
         </p:blipFill>
         <p:spPr>
           <a:xfrm>
-            <a:off x="699474" y="1938685"/>
-            <a:ext cx="3427894" cy="2818673"/>
-          </a:xfrm>
-        </p:spPr>
-      </p:pic>
-      <p:pic>
-        <p:nvPicPr>
-          <p:cNvPr id="10" name="Content Placeholder 9" descr="Chart, scatter chart&#10;&#10;Description automatically generated">
-            <a:extLst>
-              <a:ext uri="{FF2B5EF4-FFF2-40B4-BE49-F238E27FC236}">
-                <a16:creationId xmlns:a16="http://schemas.microsoft.com/office/drawing/2014/main" id="{1A66E047-3D65-4A00-A977-DC9134695514}"/>
-              </a:ext>
-            </a:extLst>
-          </p:cNvPr>
-          <p:cNvPicPr>
-            <a:picLocks noGrp="1" noChangeAspect="1"/>
-          </p:cNvPicPr>
-          <p:nvPr>
-            <p:ph sz="half" idx="2"/>
-          </p:nvPr>
-        </p:nvPicPr>
-        <p:blipFill>
-          <a:blip r:embed="rId3">
-            <a:extLst>
-              <a:ext uri="{28A0092B-C50C-407E-A947-70E740481C1C}">
-                <a14:useLocalDpi xmlns:a14="http://schemas.microsoft.com/office/drawing/2010/main" val="0"/>
-              </a:ext>
-            </a:extLst>
-          </a:blip>
-          <a:stretch>
-            <a:fillRect/>
-          </a:stretch>
-        </p:blipFill>
-        <p:spPr>
-          <a:xfrm>
-            <a:off x="3992432" y="3742442"/>
-            <a:ext cx="4021398" cy="2634708"/>
-          </a:xfrm>
-        </p:spPr>
-      </p:pic>
-      <p:pic>
-        <p:nvPicPr>
-          <p:cNvPr id="12" name="Picture 11" descr="Chart, scatter chart&#10;&#10;Description automatically generated">
-            <a:extLst>
-              <a:ext uri="{FF2B5EF4-FFF2-40B4-BE49-F238E27FC236}">
-                <a16:creationId xmlns:a16="http://schemas.microsoft.com/office/drawing/2014/main" id="{421768D6-ACC5-43DD-B644-7F6D5120D2C8}"/>
-              </a:ext>
-            </a:extLst>
-          </p:cNvPr>
-          <p:cNvPicPr>
-            <a:picLocks noChangeAspect="1"/>
-          </p:cNvPicPr>
-          <p:nvPr/>
-        </p:nvPicPr>
-        <p:blipFill>
-          <a:blip r:embed="rId4">
-            <a:extLst>
-              <a:ext uri="{28A0092B-C50C-407E-A947-70E740481C1C}">
-                <a14:useLocalDpi xmlns:a14="http://schemas.microsoft.com/office/drawing/2010/main" val="0"/>
-              </a:ext>
-            </a:extLst>
-          </a:blip>
-          <a:stretch>
-            <a:fillRect/>
-          </a:stretch>
-        </p:blipFill>
-        <p:spPr>
-          <a:xfrm>
-            <a:off x="8064631" y="1938686"/>
-            <a:ext cx="4086520" cy="2936924"/>
-          </a:xfrm>
-          <a:prstGeom prst="rect">
-            <a:avLst/>
-          </a:prstGeom>
+            <a:off x="1882390" y="3633695"/>
+            <a:ext cx="8427220" cy="2665353"/>
+          </a:xfrm>
         </p:spPr>
       </p:pic>
     </p:spTree>
     <p:extLst>
       <p:ext uri="{BB962C8B-B14F-4D97-AF65-F5344CB8AC3E}">
-        <p14:creationId xmlns:p14="http://schemas.microsoft.com/office/powerpoint/2010/main" val="1265406290"/>
+        <p14:creationId xmlns:p14="http://schemas.microsoft.com/office/powerpoint/2010/main" val="2343329347"/>
       </p:ext>
     </p:extLst>
   </p:cSld>
@@ -5816,7 +5938,7 @@
           <p:cNvPr id="2" name="Title 1">
             <a:extLst>
               <a:ext uri="{FF2B5EF4-FFF2-40B4-BE49-F238E27FC236}">
-                <a16:creationId xmlns:a16="http://schemas.microsoft.com/office/drawing/2014/main" id="{3D4E0451-3BD3-4D78-8F84-D8B3D8B1A794}"/>
+                <a16:creationId xmlns:a16="http://schemas.microsoft.com/office/drawing/2014/main" id="{01F8B8F7-CC64-46B2-B625-E8DDB7A58B46}"/>
               </a:ext>
             </a:extLst>
           </p:cNvPr>
@@ -5836,17 +5958,17 @@
           <a:p>
             <a:r>
               <a:rPr lang="en-US" dirty="0"/>
-              <a:t>How will the life expectancy be impacted by healthcare parameter?</a:t>
+              <a:t>How will the life expectancy be impacted by education parameter?</a:t>
             </a:r>
           </a:p>
         </p:txBody>
       </p:sp>
       <p:pic>
         <p:nvPicPr>
-          <p:cNvPr id="6" name="Content Placeholder 5" descr="Chart, scatter chart&#10;&#10;Description automatically generated">
-            <a:extLst>
-              <a:ext uri="{FF2B5EF4-FFF2-40B4-BE49-F238E27FC236}">
-                <a16:creationId xmlns:a16="http://schemas.microsoft.com/office/drawing/2014/main" id="{4FCB2D05-C297-4A87-8579-6831789294F3}"/>
+          <p:cNvPr id="8" name="Content Placeholder 7" descr="Chart, scatter chart&#10;&#10;Description automatically generated">
+            <a:extLst>
+              <a:ext uri="{FF2B5EF4-FFF2-40B4-BE49-F238E27FC236}">
+                <a16:creationId xmlns:a16="http://schemas.microsoft.com/office/drawing/2014/main" id="{6360C479-A933-4CB7-9F6C-2AC0AF20728D}"/>
               </a:ext>
             </a:extLst>
           </p:cNvPr>
@@ -5871,56 +5993,17 @@
         </p:blipFill>
         <p:spPr>
           <a:xfrm>
-            <a:off x="281176" y="2906799"/>
-            <a:ext cx="6230407" cy="3279163"/>
+            <a:off x="699474" y="1938685"/>
+            <a:ext cx="3427894" cy="2818673"/>
           </a:xfrm>
         </p:spPr>
       </p:pic>
-      <p:sp>
-        <p:nvSpPr>
-          <p:cNvPr id="9" name="TextBox 8">
-            <a:extLst>
-              <a:ext uri="{FF2B5EF4-FFF2-40B4-BE49-F238E27FC236}">
-                <a16:creationId xmlns:a16="http://schemas.microsoft.com/office/drawing/2014/main" id="{E12EE66A-B072-4DFF-A24B-91471EE0E6FE}"/>
-              </a:ext>
-            </a:extLst>
-          </p:cNvPr>
-          <p:cNvSpPr txBox="1"/>
-          <p:nvPr/>
-        </p:nvSpPr>
-        <p:spPr>
-          <a:xfrm>
-            <a:off x="1153459" y="2067859"/>
-            <a:ext cx="4769223" cy="369332"/>
-          </a:xfrm>
-          <a:prstGeom prst="rect">
-            <a:avLst/>
-          </a:prstGeom>
-          <a:noFill/>
-        </p:spPr>
-        <p:txBody>
-          <a:bodyPr wrap="square" rtlCol="0">
-            <a:spAutoFit/>
-          </a:bodyPr>
-          <a:lstStyle/>
-          <a:p>
-            <a:pPr marL="285750" indent="-285750">
-              <a:buFont typeface="Arial" panose="020B0604020202020204" pitchFamily="34" charset="0"/>
-              <a:buChar char="•"/>
-            </a:pPr>
-            <a:r>
-              <a:rPr lang="en-US" dirty="0"/>
-              <a:t>Remember our outlier data from before….?</a:t>
-            </a:r>
-          </a:p>
-        </p:txBody>
-      </p:sp>
       <p:pic>
         <p:nvPicPr>
-          <p:cNvPr id="13" name="Content Placeholder 12" descr="Chart, scatter chart&#10;&#10;Description automatically generated">
-            <a:extLst>
-              <a:ext uri="{FF2B5EF4-FFF2-40B4-BE49-F238E27FC236}">
-                <a16:creationId xmlns:a16="http://schemas.microsoft.com/office/drawing/2014/main" id="{36EC9719-9F63-4CC0-89D6-4ABD87A1496E}"/>
+          <p:cNvPr id="10" name="Content Placeholder 9" descr="Chart, scatter chart&#10;&#10;Description automatically generated">
+            <a:extLst>
+              <a:ext uri="{FF2B5EF4-FFF2-40B4-BE49-F238E27FC236}">
+                <a16:creationId xmlns:a16="http://schemas.microsoft.com/office/drawing/2014/main" id="{1A66E047-3D65-4A00-A977-DC9134695514}"/>
               </a:ext>
             </a:extLst>
           </p:cNvPr>
@@ -5945,67 +6028,51 @@
         </p:blipFill>
         <p:spPr>
           <a:xfrm>
-            <a:off x="6780617" y="2906799"/>
-            <a:ext cx="4863281" cy="3140496"/>
+            <a:off x="3992432" y="3742442"/>
+            <a:ext cx="4021398" cy="2634708"/>
           </a:xfrm>
         </p:spPr>
       </p:pic>
-      <p:sp>
-        <p:nvSpPr>
-          <p:cNvPr id="14" name="Star: 5 Points 13">
-            <a:extLst>
-              <a:ext uri="{FF2B5EF4-FFF2-40B4-BE49-F238E27FC236}">
-                <a16:creationId xmlns:a16="http://schemas.microsoft.com/office/drawing/2014/main" id="{4FFB4A48-0172-4F92-B19F-B400B70BC8FE}"/>
-              </a:ext>
-            </a:extLst>
-          </p:cNvPr>
-          <p:cNvSpPr/>
+      <p:pic>
+        <p:nvPicPr>
+          <p:cNvPr id="12" name="Picture 11" descr="Chart, scatter chart&#10;&#10;Description automatically generated">
+            <a:extLst>
+              <a:ext uri="{FF2B5EF4-FFF2-40B4-BE49-F238E27FC236}">
+                <a16:creationId xmlns:a16="http://schemas.microsoft.com/office/drawing/2014/main" id="{421768D6-ACC5-43DD-B644-7F6D5120D2C8}"/>
+              </a:ext>
+            </a:extLst>
+          </p:cNvPr>
+          <p:cNvPicPr>
+            <a:picLocks noChangeAspect="1"/>
+          </p:cNvPicPr>
           <p:nvPr/>
-        </p:nvSpPr>
-        <p:spPr>
-          <a:xfrm>
-            <a:off x="4834455" y="4011055"/>
-            <a:ext cx="763571" cy="805992"/>
-          </a:xfrm>
-          <a:prstGeom prst="star5">
+        </p:nvPicPr>
+        <p:blipFill>
+          <a:blip r:embed="rId4">
+            <a:extLst>
+              <a:ext uri="{28A0092B-C50C-407E-A947-70E740481C1C}">
+                <a14:useLocalDpi xmlns:a14="http://schemas.microsoft.com/office/drawing/2010/main" val="0"/>
+              </a:ext>
+            </a:extLst>
+          </a:blip>
+          <a:stretch>
+            <a:fillRect/>
+          </a:stretch>
+        </p:blipFill>
+        <p:spPr>
+          <a:xfrm>
+            <a:off x="8064631" y="1938686"/>
+            <a:ext cx="4086520" cy="2936924"/>
+          </a:xfrm>
+          <a:prstGeom prst="rect">
             <a:avLst/>
           </a:prstGeom>
-          <a:noFill/>
-          <a:ln w="38100">
-            <a:solidFill>
-              <a:srgbClr val="FFC000"/>
-            </a:solidFill>
-          </a:ln>
-        </p:spPr>
-        <p:style>
-          <a:lnRef idx="2">
-            <a:schemeClr val="accent1">
-              <a:shade val="50000"/>
-            </a:schemeClr>
-          </a:lnRef>
-          <a:fillRef idx="1">
-            <a:schemeClr val="accent1"/>
-          </a:fillRef>
-          <a:effectRef idx="0">
-            <a:schemeClr val="accent1"/>
-          </a:effectRef>
-          <a:fontRef idx="minor">
-            <a:schemeClr val="lt1"/>
-          </a:fontRef>
-        </p:style>
-        <p:txBody>
-          <a:bodyPr rtlCol="0" anchor="ctr"/>
-          <a:lstStyle/>
-          <a:p>
-            <a:pPr algn="ctr"/>
-            <a:endParaRPr lang="en-US"/>
-          </a:p>
-        </p:txBody>
-      </p:sp>
+        </p:spPr>
+      </p:pic>
     </p:spTree>
     <p:extLst>
       <p:ext uri="{BB962C8B-B14F-4D97-AF65-F5344CB8AC3E}">
-        <p14:creationId xmlns:p14="http://schemas.microsoft.com/office/powerpoint/2010/main" val="3469790076"/>
+        <p14:creationId xmlns:p14="http://schemas.microsoft.com/office/powerpoint/2010/main" val="1265406290"/>
       </p:ext>
     </p:extLst>
   </p:cSld>

</xml_diff>